<commit_message>
Add some notes about proving state properties
</commit_message>
<xml_diff>
--- a/GeneralDocumentation/BasisSchematic_Aug2019.pptx
+++ b/GeneralDocumentation/BasisSchematic_Aug2019.pptx
@@ -4,9 +4,15 @@
   <p:sldMasterIdLst>
     <p:sldMasterId id="2147483648" r:id="rId1"/>
   </p:sldMasterIdLst>
+  <p:notesMasterIdLst>
+    <p:notesMasterId r:id="rId7"/>
+  </p:notesMasterIdLst>
   <p:sldIdLst>
     <p:sldId id="256" r:id="rId2"/>
     <p:sldId id="257" r:id="rId3"/>
+    <p:sldId id="260" r:id="rId4"/>
+    <p:sldId id="258" r:id="rId5"/>
+    <p:sldId id="259" r:id="rId6"/>
   </p:sldIdLst>
   <p:sldSz cx="12192000" cy="6858000"/>
   <p:notesSz cx="6858000" cy="9144000"/>
@@ -105,7 +111,362 @@
       </a:defRPr>
     </a:lvl9pPr>
   </p:defaultTextStyle>
+  <p:extLst>
+    <p:ext uri="{EFAFB233-063F-42B5-8137-9DF3F51BA10A}">
+      <p15:sldGuideLst xmlns:p15="http://schemas.microsoft.com/office/powerpoint/2012/main"/>
+    </p:ext>
+  </p:extLst>
 </p:presentation>
+</file>
+
+<file path=ppt/notesMasters/notesMaster1.xml><?xml version="1.0" encoding="utf-8"?>
+<p:notesMaster xmlns:a="http://schemas.openxmlformats.org/drawingml/2006/main" xmlns:r="http://schemas.openxmlformats.org/officeDocument/2006/relationships" xmlns:p="http://schemas.openxmlformats.org/presentationml/2006/main">
+  <p:cSld>
+    <p:bg>
+      <p:bgRef idx="1001">
+        <a:schemeClr val="bg1"/>
+      </p:bgRef>
+    </p:bg>
+    <p:spTree>
+      <p:nvGrpSpPr>
+        <p:cNvPr id="1" name=""/>
+        <p:cNvGrpSpPr/>
+        <p:nvPr/>
+      </p:nvGrpSpPr>
+      <p:grpSpPr>
+        <a:xfrm>
+          <a:off x="0" y="0"/>
+          <a:ext cx="0" cy="0"/>
+          <a:chOff x="0" y="0"/>
+          <a:chExt cx="0" cy="0"/>
+        </a:xfrm>
+      </p:grpSpPr>
+      <p:sp>
+        <p:nvSpPr>
+          <p:cNvPr id="2" name="Header Placeholder 1"/>
+          <p:cNvSpPr>
+            <a:spLocks noGrp="1"/>
+          </p:cNvSpPr>
+          <p:nvPr>
+            <p:ph type="hdr" sz="quarter"/>
+          </p:nvPr>
+        </p:nvSpPr>
+        <p:spPr>
+          <a:xfrm>
+            <a:off x="0" y="0"/>
+            <a:ext cx="2971800" cy="458788"/>
+          </a:xfrm>
+          <a:prstGeom prst="rect">
+            <a:avLst/>
+          </a:prstGeom>
+        </p:spPr>
+        <p:txBody>
+          <a:bodyPr vert="horz" lIns="91440" tIns="45720" rIns="91440" bIns="45720" rtlCol="0"/>
+          <a:lstStyle>
+            <a:lvl1pPr algn="l">
+              <a:defRPr sz="1200"/>
+            </a:lvl1pPr>
+          </a:lstStyle>
+          <a:p>
+            <a:endParaRPr lang="en-GB"/>
+          </a:p>
+        </p:txBody>
+      </p:sp>
+      <p:sp>
+        <p:nvSpPr>
+          <p:cNvPr id="3" name="Date Placeholder 2"/>
+          <p:cNvSpPr>
+            <a:spLocks noGrp="1"/>
+          </p:cNvSpPr>
+          <p:nvPr>
+            <p:ph type="dt" idx="1"/>
+          </p:nvPr>
+        </p:nvSpPr>
+        <p:spPr>
+          <a:xfrm>
+            <a:off x="3884613" y="0"/>
+            <a:ext cx="2971800" cy="458788"/>
+          </a:xfrm>
+          <a:prstGeom prst="rect">
+            <a:avLst/>
+          </a:prstGeom>
+        </p:spPr>
+        <p:txBody>
+          <a:bodyPr vert="horz" lIns="91440" tIns="45720" rIns="91440" bIns="45720" rtlCol="0"/>
+          <a:lstStyle>
+            <a:lvl1pPr algn="r">
+              <a:defRPr sz="1200"/>
+            </a:lvl1pPr>
+          </a:lstStyle>
+          <a:p>
+            <a:fld id="{281DB0D0-0865-F24D-9A8D-D92FC0FD7497}" type="datetimeFigureOut">
+              <a:rPr lang="en-GB" smtClean="0"/>
+              <a:t>24/09/2019</a:t>
+            </a:fld>
+            <a:endParaRPr lang="en-GB"/>
+          </a:p>
+        </p:txBody>
+      </p:sp>
+      <p:sp>
+        <p:nvSpPr>
+          <p:cNvPr id="4" name="Slide Image Placeholder 3"/>
+          <p:cNvSpPr>
+            <a:spLocks noGrp="1" noRot="1" noChangeAspect="1"/>
+          </p:cNvSpPr>
+          <p:nvPr>
+            <p:ph type="sldImg" idx="2"/>
+          </p:nvPr>
+        </p:nvSpPr>
+        <p:spPr>
+          <a:xfrm>
+            <a:off x="685800" y="1143000"/>
+            <a:ext cx="5486400" cy="3086100"/>
+          </a:xfrm>
+          <a:prstGeom prst="rect">
+            <a:avLst/>
+          </a:prstGeom>
+          <a:noFill/>
+          <a:ln w="12700">
+            <a:solidFill>
+              <a:prstClr val="black"/>
+            </a:solidFill>
+          </a:ln>
+        </p:spPr>
+        <p:txBody>
+          <a:bodyPr vert="horz" lIns="91440" tIns="45720" rIns="91440" bIns="45720" rtlCol="0" anchor="ctr"/>
+          <a:lstStyle/>
+          <a:p>
+            <a:endParaRPr lang="en-GB"/>
+          </a:p>
+        </p:txBody>
+      </p:sp>
+      <p:sp>
+        <p:nvSpPr>
+          <p:cNvPr id="5" name="Notes Placeholder 4"/>
+          <p:cNvSpPr>
+            <a:spLocks noGrp="1"/>
+          </p:cNvSpPr>
+          <p:nvPr>
+            <p:ph type="body" sz="quarter" idx="3"/>
+          </p:nvPr>
+        </p:nvSpPr>
+        <p:spPr>
+          <a:xfrm>
+            <a:off x="685800" y="4400550"/>
+            <a:ext cx="5486400" cy="3600450"/>
+          </a:xfrm>
+          <a:prstGeom prst="rect">
+            <a:avLst/>
+          </a:prstGeom>
+        </p:spPr>
+        <p:txBody>
+          <a:bodyPr vert="horz" lIns="91440" tIns="45720" rIns="91440" bIns="45720" rtlCol="0"/>
+          <a:lstStyle/>
+          <a:p>
+            <a:pPr lvl="0"/>
+            <a:r>
+              <a:rPr lang="en-US" smtClean="0"/>
+              <a:t>Click to edit Master text styles</a:t>
+            </a:r>
+          </a:p>
+          <a:p>
+            <a:pPr lvl="1"/>
+            <a:r>
+              <a:rPr lang="en-US" smtClean="0"/>
+              <a:t>Second level</a:t>
+            </a:r>
+          </a:p>
+          <a:p>
+            <a:pPr lvl="2"/>
+            <a:r>
+              <a:rPr lang="en-US" smtClean="0"/>
+              <a:t>Third level</a:t>
+            </a:r>
+          </a:p>
+          <a:p>
+            <a:pPr lvl="3"/>
+            <a:r>
+              <a:rPr lang="en-US" smtClean="0"/>
+              <a:t>Fourth level</a:t>
+            </a:r>
+          </a:p>
+          <a:p>
+            <a:pPr lvl="4"/>
+            <a:r>
+              <a:rPr lang="en-US" smtClean="0"/>
+              <a:t>Fifth level</a:t>
+            </a:r>
+            <a:endParaRPr lang="en-GB"/>
+          </a:p>
+        </p:txBody>
+      </p:sp>
+      <p:sp>
+        <p:nvSpPr>
+          <p:cNvPr id="6" name="Footer Placeholder 5"/>
+          <p:cNvSpPr>
+            <a:spLocks noGrp="1"/>
+          </p:cNvSpPr>
+          <p:nvPr>
+            <p:ph type="ftr" sz="quarter" idx="4"/>
+          </p:nvPr>
+        </p:nvSpPr>
+        <p:spPr>
+          <a:xfrm>
+            <a:off x="0" y="8685213"/>
+            <a:ext cx="2971800" cy="458787"/>
+          </a:xfrm>
+          <a:prstGeom prst="rect">
+            <a:avLst/>
+          </a:prstGeom>
+        </p:spPr>
+        <p:txBody>
+          <a:bodyPr vert="horz" lIns="91440" tIns="45720" rIns="91440" bIns="45720" rtlCol="0" anchor="b"/>
+          <a:lstStyle>
+            <a:lvl1pPr algn="l">
+              <a:defRPr sz="1200"/>
+            </a:lvl1pPr>
+          </a:lstStyle>
+          <a:p>
+            <a:endParaRPr lang="en-GB"/>
+          </a:p>
+        </p:txBody>
+      </p:sp>
+      <p:sp>
+        <p:nvSpPr>
+          <p:cNvPr id="7" name="Slide Number Placeholder 6"/>
+          <p:cNvSpPr>
+            <a:spLocks noGrp="1"/>
+          </p:cNvSpPr>
+          <p:nvPr>
+            <p:ph type="sldNum" sz="quarter" idx="5"/>
+          </p:nvPr>
+        </p:nvSpPr>
+        <p:spPr>
+          <a:xfrm>
+            <a:off x="3884613" y="8685213"/>
+            <a:ext cx="2971800" cy="458787"/>
+          </a:xfrm>
+          <a:prstGeom prst="rect">
+            <a:avLst/>
+          </a:prstGeom>
+        </p:spPr>
+        <p:txBody>
+          <a:bodyPr vert="horz" lIns="91440" tIns="45720" rIns="91440" bIns="45720" rtlCol="0" anchor="b"/>
+          <a:lstStyle>
+            <a:lvl1pPr algn="r">
+              <a:defRPr sz="1200"/>
+            </a:lvl1pPr>
+          </a:lstStyle>
+          <a:p>
+            <a:fld id="{182E3036-754C-314A-A915-4479E10992D7}" type="slidenum">
+              <a:rPr lang="en-GB" smtClean="0"/>
+              <a:t>‹#›</a:t>
+            </a:fld>
+            <a:endParaRPr lang="en-GB"/>
+          </a:p>
+        </p:txBody>
+      </p:sp>
+    </p:spTree>
+    <p:extLst>
+      <p:ext uri="{BB962C8B-B14F-4D97-AF65-F5344CB8AC3E}">
+        <p14:creationId xmlns:p14="http://schemas.microsoft.com/office/powerpoint/2010/main" val="2101959440"/>
+      </p:ext>
+    </p:extLst>
+  </p:cSld>
+  <p:clrMap bg1="lt1" tx1="dk1" bg2="lt2" tx2="dk2" accent1="accent1" accent2="accent2" accent3="accent3" accent4="accent4" accent5="accent5" accent6="accent6" hlink="hlink" folHlink="folHlink"/>
+  <p:notesStyle>
+    <a:lvl1pPr marL="0" algn="l" defTabSz="914400" rtl="0" eaLnBrk="1" latinLnBrk="0" hangingPunct="1">
+      <a:defRPr sz="1200" kern="1200">
+        <a:solidFill>
+          <a:schemeClr val="tx1"/>
+        </a:solidFill>
+        <a:latin typeface="+mn-lt"/>
+        <a:ea typeface="+mn-ea"/>
+        <a:cs typeface="+mn-cs"/>
+      </a:defRPr>
+    </a:lvl1pPr>
+    <a:lvl2pPr marL="457200" algn="l" defTabSz="914400" rtl="0" eaLnBrk="1" latinLnBrk="0" hangingPunct="1">
+      <a:defRPr sz="1200" kern="1200">
+        <a:solidFill>
+          <a:schemeClr val="tx1"/>
+        </a:solidFill>
+        <a:latin typeface="+mn-lt"/>
+        <a:ea typeface="+mn-ea"/>
+        <a:cs typeface="+mn-cs"/>
+      </a:defRPr>
+    </a:lvl2pPr>
+    <a:lvl3pPr marL="914400" algn="l" defTabSz="914400" rtl="0" eaLnBrk="1" latinLnBrk="0" hangingPunct="1">
+      <a:defRPr sz="1200" kern="1200">
+        <a:solidFill>
+          <a:schemeClr val="tx1"/>
+        </a:solidFill>
+        <a:latin typeface="+mn-lt"/>
+        <a:ea typeface="+mn-ea"/>
+        <a:cs typeface="+mn-cs"/>
+      </a:defRPr>
+    </a:lvl3pPr>
+    <a:lvl4pPr marL="1371600" algn="l" defTabSz="914400" rtl="0" eaLnBrk="1" latinLnBrk="0" hangingPunct="1">
+      <a:defRPr sz="1200" kern="1200">
+        <a:solidFill>
+          <a:schemeClr val="tx1"/>
+        </a:solidFill>
+        <a:latin typeface="+mn-lt"/>
+        <a:ea typeface="+mn-ea"/>
+        <a:cs typeface="+mn-cs"/>
+      </a:defRPr>
+    </a:lvl4pPr>
+    <a:lvl5pPr marL="1828800" algn="l" defTabSz="914400" rtl="0" eaLnBrk="1" latinLnBrk="0" hangingPunct="1">
+      <a:defRPr sz="1200" kern="1200">
+        <a:solidFill>
+          <a:schemeClr val="tx1"/>
+        </a:solidFill>
+        <a:latin typeface="+mn-lt"/>
+        <a:ea typeface="+mn-ea"/>
+        <a:cs typeface="+mn-cs"/>
+      </a:defRPr>
+    </a:lvl5pPr>
+    <a:lvl6pPr marL="2286000" algn="l" defTabSz="914400" rtl="0" eaLnBrk="1" latinLnBrk="0" hangingPunct="1">
+      <a:defRPr sz="1200" kern="1200">
+        <a:solidFill>
+          <a:schemeClr val="tx1"/>
+        </a:solidFill>
+        <a:latin typeface="+mn-lt"/>
+        <a:ea typeface="+mn-ea"/>
+        <a:cs typeface="+mn-cs"/>
+      </a:defRPr>
+    </a:lvl6pPr>
+    <a:lvl7pPr marL="2743200" algn="l" defTabSz="914400" rtl="0" eaLnBrk="1" latinLnBrk="0" hangingPunct="1">
+      <a:defRPr sz="1200" kern="1200">
+        <a:solidFill>
+          <a:schemeClr val="tx1"/>
+        </a:solidFill>
+        <a:latin typeface="+mn-lt"/>
+        <a:ea typeface="+mn-ea"/>
+        <a:cs typeface="+mn-cs"/>
+      </a:defRPr>
+    </a:lvl7pPr>
+    <a:lvl8pPr marL="3200400" algn="l" defTabSz="914400" rtl="0" eaLnBrk="1" latinLnBrk="0" hangingPunct="1">
+      <a:defRPr sz="1200" kern="1200">
+        <a:solidFill>
+          <a:schemeClr val="tx1"/>
+        </a:solidFill>
+        <a:latin typeface="+mn-lt"/>
+        <a:ea typeface="+mn-ea"/>
+        <a:cs typeface="+mn-cs"/>
+      </a:defRPr>
+    </a:lvl8pPr>
+    <a:lvl9pPr marL="3657600" algn="l" defTabSz="914400" rtl="0" eaLnBrk="1" latinLnBrk="0" hangingPunct="1">
+      <a:defRPr sz="1200" kern="1200">
+        <a:solidFill>
+          <a:schemeClr val="tx1"/>
+        </a:solidFill>
+        <a:latin typeface="+mn-lt"/>
+        <a:ea typeface="+mn-ea"/>
+        <a:cs typeface="+mn-cs"/>
+      </a:defRPr>
+    </a:lvl9pPr>
+  </p:notesStyle>
+</p:notesMaster>
 </file>
 
 <file path=ppt/slideLayouts/slideLayout1.xml><?xml version="1.0" encoding="utf-8"?>
@@ -239,7 +600,7 @@
           <a:p>
             <a:fld id="{B1A3A0A9-DB88-F940-A878-47F2B1F37E90}" type="datetimeFigureOut">
               <a:rPr lang="en-GB" smtClean="0"/>
-              <a:t>14/08/2019</a:t>
+              <a:t>23/09/2019</a:t>
             </a:fld>
             <a:endParaRPr lang="en-GB" dirty="0"/>
           </a:p>
@@ -409,7 +770,7 @@
           <a:p>
             <a:fld id="{B1A3A0A9-DB88-F940-A878-47F2B1F37E90}" type="datetimeFigureOut">
               <a:rPr lang="en-GB" smtClean="0"/>
-              <a:t>14/08/2019</a:t>
+              <a:t>23/09/2019</a:t>
             </a:fld>
             <a:endParaRPr lang="en-GB" dirty="0"/>
           </a:p>
@@ -589,7 +950,7 @@
           <a:p>
             <a:fld id="{B1A3A0A9-DB88-F940-A878-47F2B1F37E90}" type="datetimeFigureOut">
               <a:rPr lang="en-GB" smtClean="0"/>
-              <a:t>14/08/2019</a:t>
+              <a:t>23/09/2019</a:t>
             </a:fld>
             <a:endParaRPr lang="en-GB" dirty="0"/>
           </a:p>
@@ -759,7 +1120,7 @@
           <a:p>
             <a:fld id="{B1A3A0A9-DB88-F940-A878-47F2B1F37E90}" type="datetimeFigureOut">
               <a:rPr lang="en-GB" smtClean="0"/>
-              <a:t>14/08/2019</a:t>
+              <a:t>23/09/2019</a:t>
             </a:fld>
             <a:endParaRPr lang="en-GB" dirty="0"/>
           </a:p>
@@ -1005,7 +1366,7 @@
           <a:p>
             <a:fld id="{B1A3A0A9-DB88-F940-A878-47F2B1F37E90}" type="datetimeFigureOut">
               <a:rPr lang="en-GB" smtClean="0"/>
-              <a:t>14/08/2019</a:t>
+              <a:t>23/09/2019</a:t>
             </a:fld>
             <a:endParaRPr lang="en-GB" dirty="0"/>
           </a:p>
@@ -1237,7 +1598,7 @@
           <a:p>
             <a:fld id="{B1A3A0A9-DB88-F940-A878-47F2B1F37E90}" type="datetimeFigureOut">
               <a:rPr lang="en-GB" smtClean="0"/>
-              <a:t>14/08/2019</a:t>
+              <a:t>23/09/2019</a:t>
             </a:fld>
             <a:endParaRPr lang="en-GB" dirty="0"/>
           </a:p>
@@ -1604,7 +1965,7 @@
           <a:p>
             <a:fld id="{B1A3A0A9-DB88-F940-A878-47F2B1F37E90}" type="datetimeFigureOut">
               <a:rPr lang="en-GB" smtClean="0"/>
-              <a:t>14/08/2019</a:t>
+              <a:t>23/09/2019</a:t>
             </a:fld>
             <a:endParaRPr lang="en-GB" dirty="0"/>
           </a:p>
@@ -1722,7 +2083,7 @@
           <a:p>
             <a:fld id="{B1A3A0A9-DB88-F940-A878-47F2B1F37E90}" type="datetimeFigureOut">
               <a:rPr lang="en-GB" smtClean="0"/>
-              <a:t>14/08/2019</a:t>
+              <a:t>23/09/2019</a:t>
             </a:fld>
             <a:endParaRPr lang="en-GB" dirty="0"/>
           </a:p>
@@ -1817,7 +2178,7 @@
           <a:p>
             <a:fld id="{B1A3A0A9-DB88-F940-A878-47F2B1F37E90}" type="datetimeFigureOut">
               <a:rPr lang="en-GB" smtClean="0"/>
-              <a:t>14/08/2019</a:t>
+              <a:t>23/09/2019</a:t>
             </a:fld>
             <a:endParaRPr lang="en-GB" dirty="0"/>
           </a:p>
@@ -2094,7 +2455,7 @@
           <a:p>
             <a:fld id="{B1A3A0A9-DB88-F940-A878-47F2B1F37E90}" type="datetimeFigureOut">
               <a:rPr lang="en-GB" smtClean="0"/>
-              <a:t>14/08/2019</a:t>
+              <a:t>23/09/2019</a:t>
             </a:fld>
             <a:endParaRPr lang="en-GB" dirty="0"/>
           </a:p>
@@ -2347,7 +2708,7 @@
           <a:p>
             <a:fld id="{B1A3A0A9-DB88-F940-A878-47F2B1F37E90}" type="datetimeFigureOut">
               <a:rPr lang="en-GB" smtClean="0"/>
-              <a:t>14/08/2019</a:t>
+              <a:t>23/09/2019</a:t>
             </a:fld>
             <a:endParaRPr lang="en-GB" dirty="0"/>
           </a:p>
@@ -2560,7 +2921,7 @@
           <a:p>
             <a:fld id="{B1A3A0A9-DB88-F940-A878-47F2B1F37E90}" type="datetimeFigureOut">
               <a:rPr lang="en-GB" smtClean="0"/>
-              <a:t>14/08/2019</a:t>
+              <a:t>23/09/2019</a:t>
             </a:fld>
             <a:endParaRPr lang="en-GB" dirty="0"/>
           </a:p>
@@ -3645,11 +4006,7 @@
           <a:p>
             <a:r>
               <a:rPr lang="en-GB" dirty="0" smtClean="0"/>
-              <a:t>deQInt</a:t>
-            </a:r>
-            <a:r>
-              <a:rPr lang="en-GB" dirty="0" smtClean="0"/>
-              <a:t> </a:t>
+              <a:t>deQInt </a:t>
             </a:r>
           </a:p>
           <a:p>
@@ -3661,15 +4018,7 @@
           <a:p>
             <a:r>
               <a:rPr lang="en-GB" dirty="0" smtClean="0"/>
-              <a:t>/</a:t>
-            </a:r>
-            <a:r>
-              <a:rPr lang="en-GB" dirty="0" smtClean="0"/>
-              <a:t> UC:=FALSE, </a:t>
-            </a:r>
-            <a:r>
-              <a:rPr lang="en-GB" dirty="0" smtClean="0"/>
-              <a:t>dt :: intQ </a:t>
+              <a:t>/ UC:=FALSE, dt :: intQ </a:t>
             </a:r>
             <a:endParaRPr lang="en-GB" dirty="0"/>
           </a:p>
@@ -3719,7 +4068,6 @@
               <a:rPr lang="en-GB" dirty="0" smtClean="0"/>
               <a:t>/ dt :={}</a:t>
             </a:r>
-            <a:endParaRPr lang="en-GB" dirty="0" smtClean="0"/>
           </a:p>
         </p:txBody>
       </p:sp>
@@ -3753,11 +4101,7 @@
           <a:p>
             <a:r>
               <a:rPr lang="en-GB" dirty="0" smtClean="0"/>
-              <a:t>/ </a:t>
-            </a:r>
-            <a:r>
-              <a:rPr lang="en-GB" dirty="0" smtClean="0"/>
-              <a:t>dt :={}</a:t>
+              <a:t>/ dt :={}</a:t>
             </a:r>
           </a:p>
         </p:txBody>
@@ -3833,6 +4177,1356 @@
     <p:extLst>
       <p:ext uri="{BB962C8B-B14F-4D97-AF65-F5344CB8AC3E}">
         <p14:creationId xmlns:p14="http://schemas.microsoft.com/office/powerpoint/2010/main" val="2109839703"/>
+      </p:ext>
+    </p:extLst>
+  </p:cSld>
+  <p:clrMapOvr>
+    <a:masterClrMapping/>
+  </p:clrMapOvr>
+</p:sld>
+</file>
+
+<file path=ppt/slides/slide3.xml><?xml version="1.0" encoding="utf-8"?>
+<p:sld xmlns:a="http://schemas.openxmlformats.org/drawingml/2006/main" xmlns:r="http://schemas.openxmlformats.org/officeDocument/2006/relationships" xmlns:p="http://schemas.openxmlformats.org/presentationml/2006/main">
+  <p:cSld>
+    <p:spTree>
+      <p:nvGrpSpPr>
+        <p:cNvPr id="1" name=""/>
+        <p:cNvGrpSpPr/>
+        <p:nvPr/>
+      </p:nvGrpSpPr>
+      <p:grpSpPr>
+        <a:xfrm>
+          <a:off x="0" y="0"/>
+          <a:ext cx="0" cy="0"/>
+          <a:chOff x="0" y="0"/>
+          <a:chExt cx="0" cy="0"/>
+        </a:xfrm>
+      </p:grpSpPr>
+      <p:sp>
+        <p:nvSpPr>
+          <p:cNvPr id="4" name="Rectangle 3"/>
+          <p:cNvSpPr/>
+          <p:nvPr/>
+        </p:nvSpPr>
+        <p:spPr>
+          <a:xfrm>
+            <a:off x="593891" y="467751"/>
+            <a:ext cx="7927848" cy="2578608"/>
+          </a:xfrm>
+          <a:prstGeom prst="rect">
+            <a:avLst/>
+          </a:prstGeom>
+        </p:spPr>
+        <p:style>
+          <a:lnRef idx="2">
+            <a:schemeClr val="accent1">
+              <a:shade val="50000"/>
+            </a:schemeClr>
+          </a:lnRef>
+          <a:fillRef idx="1">
+            <a:schemeClr val="accent1"/>
+          </a:fillRef>
+          <a:effectRef idx="0">
+            <a:schemeClr val="accent1"/>
+          </a:effectRef>
+          <a:fontRef idx="minor">
+            <a:schemeClr val="lt1"/>
+          </a:fontRef>
+        </p:style>
+        <p:txBody>
+          <a:bodyPr rtlCol="0" anchor="t" anchorCtr="0"/>
+          <a:lstStyle/>
+          <a:p>
+            <a:pPr algn="ctr"/>
+            <a:r>
+              <a:rPr lang="en-GB" dirty="0" smtClean="0"/>
+              <a:t>Firing transitions</a:t>
+            </a:r>
+            <a:endParaRPr lang="en-GB" dirty="0"/>
+          </a:p>
+        </p:txBody>
+      </p:sp>
+      <p:sp>
+        <p:nvSpPr>
+          <p:cNvPr id="5" name="Rectangle 4"/>
+          <p:cNvSpPr/>
+          <p:nvPr/>
+        </p:nvSpPr>
+        <p:spPr>
+          <a:xfrm>
+            <a:off x="1500552" y="1273906"/>
+            <a:ext cx="1312985" cy="914400"/>
+          </a:xfrm>
+          <a:prstGeom prst="rect">
+            <a:avLst/>
+          </a:prstGeom>
+          <a:solidFill>
+            <a:schemeClr val="accent1">
+              <a:lumMod val="40000"/>
+              <a:lumOff val="60000"/>
+            </a:schemeClr>
+          </a:solidFill>
+        </p:spPr>
+        <p:style>
+          <a:lnRef idx="2">
+            <a:schemeClr val="accent1">
+              <a:shade val="50000"/>
+            </a:schemeClr>
+          </a:lnRef>
+          <a:fillRef idx="1">
+            <a:schemeClr val="accent1"/>
+          </a:fillRef>
+          <a:effectRef idx="0">
+            <a:schemeClr val="accent1"/>
+          </a:effectRef>
+          <a:fontRef idx="minor">
+            <a:schemeClr val="lt1"/>
+          </a:fontRef>
+        </p:style>
+        <p:txBody>
+          <a:bodyPr rtlCol="0" anchor="ctr"/>
+          <a:lstStyle/>
+          <a:p>
+            <a:pPr algn="ctr"/>
+            <a:r>
+              <a:rPr lang="en-GB" dirty="0" smtClean="0"/>
+              <a:t>Firing triggered</a:t>
+            </a:r>
+            <a:endParaRPr lang="en-GB" dirty="0"/>
+          </a:p>
+        </p:txBody>
+      </p:sp>
+      <p:sp>
+        <p:nvSpPr>
+          <p:cNvPr id="6" name="Rectangle 5"/>
+          <p:cNvSpPr/>
+          <p:nvPr/>
+        </p:nvSpPr>
+        <p:spPr>
+          <a:xfrm>
+            <a:off x="5568460" y="1273906"/>
+            <a:ext cx="1664678" cy="914400"/>
+          </a:xfrm>
+          <a:prstGeom prst="rect">
+            <a:avLst/>
+          </a:prstGeom>
+          <a:solidFill>
+            <a:schemeClr val="accent1">
+              <a:lumMod val="40000"/>
+              <a:lumOff val="60000"/>
+            </a:schemeClr>
+          </a:solidFill>
+        </p:spPr>
+        <p:style>
+          <a:lnRef idx="2">
+            <a:schemeClr val="accent1">
+              <a:shade val="50000"/>
+            </a:schemeClr>
+          </a:lnRef>
+          <a:fillRef idx="1">
+            <a:schemeClr val="accent1"/>
+          </a:fillRef>
+          <a:effectRef idx="0">
+            <a:schemeClr val="accent1"/>
+          </a:effectRef>
+          <a:fontRef idx="minor">
+            <a:schemeClr val="lt1"/>
+          </a:fontRef>
+        </p:style>
+        <p:txBody>
+          <a:bodyPr rtlCol="0" anchor="ctr"/>
+          <a:lstStyle/>
+          <a:p>
+            <a:pPr algn="ctr"/>
+            <a:r>
+              <a:rPr lang="en-GB" dirty="0" smtClean="0"/>
+              <a:t>Firing un-triggered</a:t>
+            </a:r>
+            <a:endParaRPr lang="en-GB" dirty="0"/>
+          </a:p>
+        </p:txBody>
+      </p:sp>
+      <p:sp>
+        <p:nvSpPr>
+          <p:cNvPr id="7" name="Rectangle 6"/>
+          <p:cNvSpPr/>
+          <p:nvPr/>
+        </p:nvSpPr>
+        <p:spPr>
+          <a:xfrm>
+            <a:off x="476660" y="5627657"/>
+            <a:ext cx="8045079" cy="914400"/>
+          </a:xfrm>
+          <a:prstGeom prst="rect">
+            <a:avLst/>
+          </a:prstGeom>
+        </p:spPr>
+        <p:style>
+          <a:lnRef idx="2">
+            <a:schemeClr val="accent1">
+              <a:shade val="50000"/>
+            </a:schemeClr>
+          </a:lnRef>
+          <a:fillRef idx="1">
+            <a:schemeClr val="accent1"/>
+          </a:fillRef>
+          <a:effectRef idx="0">
+            <a:schemeClr val="accent1"/>
+          </a:effectRef>
+          <a:fontRef idx="minor">
+            <a:schemeClr val="lt1"/>
+          </a:fontRef>
+        </p:style>
+        <p:txBody>
+          <a:bodyPr rtlCol="0" anchor="ctr"/>
+          <a:lstStyle/>
+          <a:p>
+            <a:pPr algn="ctr"/>
+            <a:r>
+              <a:rPr lang="en-GB" dirty="0" smtClean="0"/>
+              <a:t>Ready to de-queue</a:t>
+            </a:r>
+            <a:endParaRPr lang="en-GB" dirty="0"/>
+          </a:p>
+        </p:txBody>
+      </p:sp>
+      <p:cxnSp>
+        <p:nvCxnSpPr>
+          <p:cNvPr id="9" name="Straight Arrow Connector 8"/>
+          <p:cNvCxnSpPr>
+            <a:stCxn id="10" idx="2"/>
+            <a:endCxn id="6" idx="3"/>
+          </p:cNvCxnSpPr>
+          <p:nvPr/>
+        </p:nvCxnSpPr>
+        <p:spPr>
+          <a:xfrm flipH="1">
+            <a:off x="7233138" y="1703543"/>
+            <a:ext cx="2096553" cy="27563"/>
+          </a:xfrm>
+          <a:prstGeom prst="straightConnector1">
+            <a:avLst/>
+          </a:prstGeom>
+          <a:ln w="25400">
+            <a:solidFill>
+              <a:schemeClr val="tx1"/>
+            </a:solidFill>
+            <a:tailEnd type="triangle"/>
+          </a:ln>
+        </p:spPr>
+        <p:style>
+          <a:lnRef idx="1">
+            <a:schemeClr val="accent1"/>
+          </a:lnRef>
+          <a:fillRef idx="0">
+            <a:schemeClr val="accent1"/>
+          </a:fillRef>
+          <a:effectRef idx="0">
+            <a:schemeClr val="accent1"/>
+          </a:effectRef>
+          <a:fontRef idx="minor">
+            <a:schemeClr val="tx1"/>
+          </a:fontRef>
+        </p:style>
+      </p:cxnSp>
+      <p:sp>
+        <p:nvSpPr>
+          <p:cNvPr id="10" name="Oval 9"/>
+          <p:cNvSpPr/>
+          <p:nvPr/>
+        </p:nvSpPr>
+        <p:spPr>
+          <a:xfrm>
+            <a:off x="9329691" y="1508895"/>
+            <a:ext cx="505033" cy="389296"/>
+          </a:xfrm>
+          <a:prstGeom prst="ellipse">
+            <a:avLst/>
+          </a:prstGeom>
+          <a:solidFill>
+            <a:schemeClr val="tx1"/>
+          </a:solidFill>
+        </p:spPr>
+        <p:style>
+          <a:lnRef idx="2">
+            <a:schemeClr val="accent1">
+              <a:shade val="50000"/>
+            </a:schemeClr>
+          </a:lnRef>
+          <a:fillRef idx="1">
+            <a:schemeClr val="accent1"/>
+          </a:fillRef>
+          <a:effectRef idx="0">
+            <a:schemeClr val="accent1"/>
+          </a:effectRef>
+          <a:fontRef idx="minor">
+            <a:schemeClr val="lt1"/>
+          </a:fontRef>
+        </p:style>
+        <p:txBody>
+          <a:bodyPr rtlCol="0" anchor="ctr"/>
+          <a:lstStyle/>
+          <a:p>
+            <a:pPr algn="ctr"/>
+            <a:endParaRPr lang="en-GB" dirty="0"/>
+          </a:p>
+        </p:txBody>
+      </p:sp>
+      <p:sp>
+        <p:nvSpPr>
+          <p:cNvPr id="12" name="TextBox 11"/>
+          <p:cNvSpPr txBox="1"/>
+          <p:nvPr/>
+        </p:nvSpPr>
+        <p:spPr>
+          <a:xfrm>
+            <a:off x="8676600" y="1925754"/>
+            <a:ext cx="2002343" cy="646331"/>
+          </a:xfrm>
+          <a:prstGeom prst="rect">
+            <a:avLst/>
+          </a:prstGeom>
+          <a:noFill/>
+        </p:spPr>
+        <p:txBody>
+          <a:bodyPr wrap="none" rtlCol="0">
+            <a:spAutoFit/>
+          </a:bodyPr>
+          <a:lstStyle/>
+          <a:p>
+            <a:r>
+              <a:rPr lang="en-GB" dirty="0" smtClean="0"/>
+              <a:t>Initialisation </a:t>
+            </a:r>
+          </a:p>
+          <a:p>
+            <a:r>
+              <a:rPr lang="en-GB" dirty="0"/>
+              <a:t>/</a:t>
+            </a:r>
+            <a:r>
+              <a:rPr lang="en-GB" dirty="0" smtClean="0"/>
+              <a:t>UC:=FALSE,  dt :={}</a:t>
+            </a:r>
+            <a:endParaRPr lang="en-GB" dirty="0"/>
+          </a:p>
+        </p:txBody>
+      </p:sp>
+      <p:cxnSp>
+        <p:nvCxnSpPr>
+          <p:cNvPr id="13" name="Straight Arrow Connector 12"/>
+          <p:cNvCxnSpPr/>
+          <p:nvPr/>
+        </p:nvCxnSpPr>
+        <p:spPr>
+          <a:xfrm flipH="1">
+            <a:off x="6283568" y="2214714"/>
+            <a:ext cx="35170" cy="3412943"/>
+          </a:xfrm>
+          <a:prstGeom prst="straightConnector1">
+            <a:avLst/>
+          </a:prstGeom>
+          <a:ln w="25400">
+            <a:solidFill>
+              <a:schemeClr val="tx1"/>
+            </a:solidFill>
+            <a:tailEnd type="triangle"/>
+          </a:ln>
+        </p:spPr>
+        <p:style>
+          <a:lnRef idx="1">
+            <a:schemeClr val="accent1"/>
+          </a:lnRef>
+          <a:fillRef idx="0">
+            <a:schemeClr val="accent1"/>
+          </a:fillRef>
+          <a:effectRef idx="0">
+            <a:schemeClr val="accent1"/>
+          </a:effectRef>
+          <a:fontRef idx="minor">
+            <a:schemeClr val="tx1"/>
+          </a:fontRef>
+        </p:style>
+      </p:cxnSp>
+      <p:cxnSp>
+        <p:nvCxnSpPr>
+          <p:cNvPr id="15" name="Straight Arrow Connector 14"/>
+          <p:cNvCxnSpPr/>
+          <p:nvPr/>
+        </p:nvCxnSpPr>
+        <p:spPr>
+          <a:xfrm>
+            <a:off x="2813537" y="1590429"/>
+            <a:ext cx="2754923" cy="0"/>
+          </a:xfrm>
+          <a:prstGeom prst="straightConnector1">
+            <a:avLst/>
+          </a:prstGeom>
+          <a:ln w="25400">
+            <a:solidFill>
+              <a:schemeClr val="tx1"/>
+            </a:solidFill>
+            <a:tailEnd type="triangle"/>
+          </a:ln>
+        </p:spPr>
+        <p:style>
+          <a:lnRef idx="1">
+            <a:schemeClr val="accent1"/>
+          </a:lnRef>
+          <a:fillRef idx="0">
+            <a:schemeClr val="accent1"/>
+          </a:fillRef>
+          <a:effectRef idx="0">
+            <a:schemeClr val="accent1"/>
+          </a:effectRef>
+          <a:fontRef idx="minor">
+            <a:schemeClr val="tx1"/>
+          </a:fontRef>
+        </p:style>
+      </p:cxnSp>
+      <p:cxnSp>
+        <p:nvCxnSpPr>
+          <p:cNvPr id="18" name="Straight Arrow Connector 17"/>
+          <p:cNvCxnSpPr/>
+          <p:nvPr/>
+        </p:nvCxnSpPr>
+        <p:spPr>
+          <a:xfrm>
+            <a:off x="2813537" y="2103185"/>
+            <a:ext cx="2754923" cy="0"/>
+          </a:xfrm>
+          <a:prstGeom prst="straightConnector1">
+            <a:avLst/>
+          </a:prstGeom>
+          <a:ln w="25400">
+            <a:solidFill>
+              <a:schemeClr val="tx1"/>
+            </a:solidFill>
+            <a:tailEnd type="triangle"/>
+          </a:ln>
+        </p:spPr>
+        <p:style>
+          <a:lnRef idx="1">
+            <a:schemeClr val="accent1"/>
+          </a:lnRef>
+          <a:fillRef idx="0">
+            <a:schemeClr val="accent1"/>
+          </a:fillRef>
+          <a:effectRef idx="0">
+            <a:schemeClr val="accent1"/>
+          </a:effectRef>
+          <a:fontRef idx="minor">
+            <a:schemeClr val="tx1"/>
+          </a:fontRef>
+        </p:style>
+      </p:cxnSp>
+      <p:sp>
+        <p:nvSpPr>
+          <p:cNvPr id="19" name="TextBox 18"/>
+          <p:cNvSpPr txBox="1"/>
+          <p:nvPr/>
+        </p:nvSpPr>
+        <p:spPr>
+          <a:xfrm>
+            <a:off x="6318738" y="3875343"/>
+            <a:ext cx="5263662" cy="1477328"/>
+          </a:xfrm>
+          <a:prstGeom prst="rect">
+            <a:avLst/>
+          </a:prstGeom>
+          <a:noFill/>
+        </p:spPr>
+        <p:txBody>
+          <a:bodyPr wrap="square" rtlCol="0">
+            <a:spAutoFit/>
+          </a:bodyPr>
+          <a:lstStyle/>
+          <a:p>
+            <a:r>
+              <a:rPr lang="en-GB" dirty="0" smtClean="0"/>
+              <a:t>Completion</a:t>
+            </a:r>
+          </a:p>
+          <a:p>
+            <a:r>
+              <a:rPr lang="en-GB" dirty="0" smtClean="0"/>
+              <a:t> [UC=FALSE &amp; dt ={}  &amp;</a:t>
+            </a:r>
+          </a:p>
+          <a:p>
+            <a:r>
+              <a:rPr lang="en-GB" dirty="0" smtClean="0"/>
+              <a:t> &lt;conj of negated guards of all untriggered transitions&gt;] </a:t>
+            </a:r>
+          </a:p>
+          <a:p>
+            <a:r>
+              <a:rPr lang="en-GB" dirty="0" smtClean="0"/>
+              <a:t>/ UC := TRUE</a:t>
+            </a:r>
+            <a:endParaRPr lang="en-GB" dirty="0"/>
+          </a:p>
+        </p:txBody>
+      </p:sp>
+      <p:cxnSp>
+        <p:nvCxnSpPr>
+          <p:cNvPr id="20" name="Straight Arrow Connector 19"/>
+          <p:cNvCxnSpPr/>
+          <p:nvPr/>
+        </p:nvCxnSpPr>
+        <p:spPr>
+          <a:xfrm flipV="1">
+            <a:off x="1629507" y="2214714"/>
+            <a:ext cx="70339" cy="3426323"/>
+          </a:xfrm>
+          <a:prstGeom prst="straightConnector1">
+            <a:avLst/>
+          </a:prstGeom>
+          <a:ln w="25400">
+            <a:solidFill>
+              <a:schemeClr val="tx1"/>
+            </a:solidFill>
+            <a:tailEnd type="triangle"/>
+          </a:ln>
+        </p:spPr>
+        <p:style>
+          <a:lnRef idx="1">
+            <a:schemeClr val="accent1"/>
+          </a:lnRef>
+          <a:fillRef idx="0">
+            <a:schemeClr val="accent1"/>
+          </a:fillRef>
+          <a:effectRef idx="0">
+            <a:schemeClr val="accent1"/>
+          </a:effectRef>
+          <a:fontRef idx="minor">
+            <a:schemeClr val="tx1"/>
+          </a:fontRef>
+        </p:style>
+      </p:cxnSp>
+      <p:cxnSp>
+        <p:nvCxnSpPr>
+          <p:cNvPr id="23" name="Straight Arrow Connector 22"/>
+          <p:cNvCxnSpPr/>
+          <p:nvPr/>
+        </p:nvCxnSpPr>
+        <p:spPr>
+          <a:xfrm flipV="1">
+            <a:off x="2461845" y="2214714"/>
+            <a:ext cx="35170" cy="3426324"/>
+          </a:xfrm>
+          <a:prstGeom prst="straightConnector1">
+            <a:avLst/>
+          </a:prstGeom>
+          <a:ln w="25400">
+            <a:solidFill>
+              <a:schemeClr val="tx1"/>
+            </a:solidFill>
+            <a:tailEnd type="triangle"/>
+          </a:ln>
+        </p:spPr>
+        <p:style>
+          <a:lnRef idx="1">
+            <a:schemeClr val="accent1"/>
+          </a:lnRef>
+          <a:fillRef idx="0">
+            <a:schemeClr val="accent1"/>
+          </a:fillRef>
+          <a:effectRef idx="0">
+            <a:schemeClr val="accent1"/>
+          </a:effectRef>
+          <a:fontRef idx="minor">
+            <a:schemeClr val="tx1"/>
+          </a:fontRef>
+        </p:style>
+      </p:cxnSp>
+      <p:sp>
+        <p:nvSpPr>
+          <p:cNvPr id="24" name="TextBox 23"/>
+          <p:cNvSpPr txBox="1"/>
+          <p:nvPr/>
+        </p:nvSpPr>
+        <p:spPr>
+          <a:xfrm>
+            <a:off x="495164" y="3246051"/>
+            <a:ext cx="4062651" cy="923330"/>
+          </a:xfrm>
+          <a:prstGeom prst="rect">
+            <a:avLst/>
+          </a:prstGeom>
+          <a:noFill/>
+        </p:spPr>
+        <p:txBody>
+          <a:bodyPr wrap="square" rtlCol="0">
+            <a:spAutoFit/>
+          </a:bodyPr>
+          <a:lstStyle/>
+          <a:p>
+            <a:r>
+              <a:rPr lang="en-GB" dirty="0" smtClean="0"/>
+              <a:t>deQExt </a:t>
+            </a:r>
+          </a:p>
+          <a:p>
+            <a:r>
+              <a:rPr lang="en-GB" dirty="0" smtClean="0"/>
+              <a:t>[UC=TRUE &amp; intQ</a:t>
+            </a:r>
+            <a:r>
+              <a:rPr lang="en-GB" dirty="0"/>
+              <a:t>=</a:t>
+            </a:r>
+            <a:r>
+              <a:rPr lang="en-GB" dirty="0" smtClean="0"/>
+              <a:t>{} ] </a:t>
+            </a:r>
+          </a:p>
+          <a:p>
+            <a:r>
+              <a:rPr lang="en-GB" dirty="0" smtClean="0"/>
+              <a:t>/UC:=FALSE, dt::extQ</a:t>
+            </a:r>
+            <a:endParaRPr lang="en-GB" dirty="0"/>
+          </a:p>
+        </p:txBody>
+      </p:sp>
+      <p:sp>
+        <p:nvSpPr>
+          <p:cNvPr id="25" name="TextBox 24"/>
+          <p:cNvSpPr txBox="1"/>
+          <p:nvPr/>
+        </p:nvSpPr>
+        <p:spPr>
+          <a:xfrm>
+            <a:off x="1748379" y="4435224"/>
+            <a:ext cx="4289829" cy="923330"/>
+          </a:xfrm>
+          <a:prstGeom prst="rect">
+            <a:avLst/>
+          </a:prstGeom>
+          <a:noFill/>
+        </p:spPr>
+        <p:txBody>
+          <a:bodyPr wrap="square" rtlCol="0">
+            <a:spAutoFit/>
+          </a:bodyPr>
+          <a:lstStyle/>
+          <a:p>
+            <a:r>
+              <a:rPr lang="en-GB" dirty="0" smtClean="0"/>
+              <a:t>deQInt </a:t>
+            </a:r>
+          </a:p>
+          <a:p>
+            <a:r>
+              <a:rPr lang="en-GB" dirty="0" smtClean="0"/>
+              <a:t>[UC=TRUE &amp; intQ/={} ] </a:t>
+            </a:r>
+          </a:p>
+          <a:p>
+            <a:r>
+              <a:rPr lang="en-GB" dirty="0" smtClean="0"/>
+              <a:t>/ UC:=FALSE, dt :: intQ </a:t>
+            </a:r>
+            <a:endParaRPr lang="en-GB" dirty="0"/>
+          </a:p>
+        </p:txBody>
+      </p:sp>
+      <p:sp>
+        <p:nvSpPr>
+          <p:cNvPr id="52" name="TextBox 51"/>
+          <p:cNvSpPr txBox="1"/>
+          <p:nvPr/>
+        </p:nvSpPr>
+        <p:spPr>
+          <a:xfrm>
+            <a:off x="3172966" y="2103185"/>
+            <a:ext cx="2395493" cy="1754326"/>
+          </a:xfrm>
+          <a:prstGeom prst="rect">
+            <a:avLst/>
+          </a:prstGeom>
+          <a:noFill/>
+        </p:spPr>
+        <p:txBody>
+          <a:bodyPr wrap="square" rtlCol="0">
+            <a:spAutoFit/>
+          </a:bodyPr>
+          <a:lstStyle/>
+          <a:p>
+            <a:r>
+              <a:rPr lang="en-GB" dirty="0" smtClean="0"/>
+              <a:t>NoTriggeredEnabled</a:t>
+            </a:r>
+          </a:p>
+          <a:p>
+            <a:r>
+              <a:rPr lang="en-GB" dirty="0" smtClean="0"/>
+              <a:t>[UC=FALSE &amp; dt /={} &amp;</a:t>
+            </a:r>
+          </a:p>
+          <a:p>
+            <a:r>
+              <a:rPr lang="en-GB" dirty="0" smtClean="0"/>
+              <a:t> &lt;conj of negated guards of all transitions triggered by dt&gt;] </a:t>
+            </a:r>
+          </a:p>
+          <a:p>
+            <a:r>
+              <a:rPr lang="en-GB" dirty="0" smtClean="0"/>
+              <a:t>/ dt :={}</a:t>
+            </a:r>
+          </a:p>
+        </p:txBody>
+      </p:sp>
+      <p:sp>
+        <p:nvSpPr>
+          <p:cNvPr id="53" name="TextBox 52"/>
+          <p:cNvSpPr txBox="1"/>
+          <p:nvPr/>
+        </p:nvSpPr>
+        <p:spPr>
+          <a:xfrm>
+            <a:off x="3172967" y="654889"/>
+            <a:ext cx="2395493" cy="923330"/>
+          </a:xfrm>
+          <a:prstGeom prst="rect">
+            <a:avLst/>
+          </a:prstGeom>
+          <a:noFill/>
+        </p:spPr>
+        <p:txBody>
+          <a:bodyPr wrap="square" rtlCol="0">
+            <a:spAutoFit/>
+          </a:bodyPr>
+          <a:lstStyle/>
+          <a:p>
+            <a:r>
+              <a:rPr lang="en-GB" dirty="0" smtClean="0"/>
+              <a:t>fireTriggered [UC=FALSE &amp; dt /={} ] </a:t>
+            </a:r>
+          </a:p>
+          <a:p>
+            <a:r>
+              <a:rPr lang="en-GB" dirty="0" smtClean="0"/>
+              <a:t>/ dt :={}</a:t>
+            </a:r>
+          </a:p>
+        </p:txBody>
+      </p:sp>
+      <p:sp>
+        <p:nvSpPr>
+          <p:cNvPr id="54" name="TextBox 53"/>
+          <p:cNvSpPr txBox="1"/>
+          <p:nvPr/>
+        </p:nvSpPr>
+        <p:spPr>
+          <a:xfrm>
+            <a:off x="6337146" y="2194857"/>
+            <a:ext cx="2395493" cy="646331"/>
+          </a:xfrm>
+          <a:prstGeom prst="rect">
+            <a:avLst/>
+          </a:prstGeom>
+          <a:noFill/>
+        </p:spPr>
+        <p:txBody>
+          <a:bodyPr wrap="square" rtlCol="0">
+            <a:spAutoFit/>
+          </a:bodyPr>
+          <a:lstStyle/>
+          <a:p>
+            <a:r>
+              <a:rPr lang="en-GB" dirty="0" smtClean="0"/>
+              <a:t>fireUnTriggered [UC=FALSE &amp; dt ={} ] </a:t>
+            </a:r>
+          </a:p>
+        </p:txBody>
+      </p:sp>
+      <p:cxnSp>
+        <p:nvCxnSpPr>
+          <p:cNvPr id="70" name="Curved Connector 69"/>
+          <p:cNvCxnSpPr/>
+          <p:nvPr/>
+        </p:nvCxnSpPr>
+        <p:spPr>
+          <a:xfrm rot="10800000" flipV="1">
+            <a:off x="6881445" y="1984717"/>
+            <a:ext cx="329338" cy="264201"/>
+          </a:xfrm>
+          <a:prstGeom prst="curvedConnector3">
+            <a:avLst>
+              <a:gd name="adj1" fmla="val -283838"/>
+            </a:avLst>
+          </a:prstGeom>
+          <a:ln w="31750">
+            <a:solidFill>
+              <a:schemeClr val="tx1"/>
+            </a:solidFill>
+            <a:tailEnd type="triangle"/>
+          </a:ln>
+        </p:spPr>
+        <p:style>
+          <a:lnRef idx="1">
+            <a:schemeClr val="accent1"/>
+          </a:lnRef>
+          <a:fillRef idx="0">
+            <a:schemeClr val="accent1"/>
+          </a:fillRef>
+          <a:effectRef idx="0">
+            <a:schemeClr val="accent1"/>
+          </a:effectRef>
+          <a:fontRef idx="minor">
+            <a:schemeClr val="tx1"/>
+          </a:fontRef>
+        </p:style>
+      </p:cxnSp>
+      <p:sp>
+        <p:nvSpPr>
+          <p:cNvPr id="2" name="TextBox 1"/>
+          <p:cNvSpPr txBox="1"/>
+          <p:nvPr/>
+        </p:nvSpPr>
+        <p:spPr>
+          <a:xfrm>
+            <a:off x="6264385" y="5996989"/>
+            <a:ext cx="1998304" cy="369332"/>
+          </a:xfrm>
+          <a:prstGeom prst="rect">
+            <a:avLst/>
+          </a:prstGeom>
+          <a:noFill/>
+        </p:spPr>
+        <p:txBody>
+          <a:bodyPr wrap="none" rtlCol="0">
+            <a:spAutoFit/>
+          </a:bodyPr>
+          <a:lstStyle/>
+          <a:p>
+            <a:r>
+              <a:rPr lang="en-GB" dirty="0" smtClean="0">
+                <a:solidFill>
+                  <a:srgbClr val="FF0000"/>
+                </a:solidFill>
+              </a:rPr>
+              <a:t>&lt;</a:t>
+            </a:r>
+            <a:r>
+              <a:rPr lang="en-GB" smtClean="0">
+                <a:solidFill>
+                  <a:srgbClr val="FF0000"/>
+                </a:solidFill>
+              </a:rPr>
+              <a:t>property verified&gt;</a:t>
+            </a:r>
+            <a:endParaRPr lang="en-GB" dirty="0">
+              <a:solidFill>
+                <a:srgbClr val="FF0000"/>
+              </a:solidFill>
+            </a:endParaRPr>
+          </a:p>
+        </p:txBody>
+      </p:sp>
+      <p:sp>
+        <p:nvSpPr>
+          <p:cNvPr id="22" name="TextBox 21"/>
+          <p:cNvSpPr txBox="1"/>
+          <p:nvPr/>
+        </p:nvSpPr>
+        <p:spPr>
+          <a:xfrm>
+            <a:off x="1148859" y="1534161"/>
+            <a:ext cx="2125390" cy="369332"/>
+          </a:xfrm>
+          <a:prstGeom prst="rect">
+            <a:avLst/>
+          </a:prstGeom>
+          <a:noFill/>
+        </p:spPr>
+        <p:txBody>
+          <a:bodyPr wrap="none" rtlCol="0">
+            <a:spAutoFit/>
+          </a:bodyPr>
+          <a:lstStyle/>
+          <a:p>
+            <a:r>
+              <a:rPr lang="en-GB" dirty="0" smtClean="0">
+                <a:solidFill>
+                  <a:srgbClr val="FF0000"/>
+                </a:solidFill>
+              </a:rPr>
+              <a:t>&lt;property specified&gt;</a:t>
+            </a:r>
+            <a:endParaRPr lang="en-GB" dirty="0">
+              <a:solidFill>
+                <a:srgbClr val="FF0000"/>
+              </a:solidFill>
+            </a:endParaRPr>
+          </a:p>
+        </p:txBody>
+      </p:sp>
+      <p:sp>
+        <p:nvSpPr>
+          <p:cNvPr id="26" name="TextBox 25"/>
+          <p:cNvSpPr txBox="1"/>
+          <p:nvPr/>
+        </p:nvSpPr>
+        <p:spPr>
+          <a:xfrm>
+            <a:off x="3160267" y="1066781"/>
+            <a:ext cx="1189941" cy="369332"/>
+          </a:xfrm>
+          <a:prstGeom prst="rect">
+            <a:avLst/>
+          </a:prstGeom>
+          <a:noFill/>
+        </p:spPr>
+        <p:txBody>
+          <a:bodyPr wrap="none" rtlCol="0">
+            <a:spAutoFit/>
+          </a:bodyPr>
+          <a:lstStyle/>
+          <a:p>
+            <a:r>
+              <a:rPr lang="en-GB" dirty="0" smtClean="0">
+                <a:solidFill>
+                  <a:srgbClr val="FF0000"/>
+                </a:solidFill>
+              </a:rPr>
+              <a:t>&lt;reaction&gt;</a:t>
+            </a:r>
+            <a:endParaRPr lang="en-GB" dirty="0">
+              <a:solidFill>
+                <a:srgbClr val="FF0000"/>
+              </a:solidFill>
+            </a:endParaRPr>
+          </a:p>
+        </p:txBody>
+      </p:sp>
+      <p:sp>
+        <p:nvSpPr>
+          <p:cNvPr id="27" name="TextBox 26"/>
+          <p:cNvSpPr txBox="1"/>
+          <p:nvPr/>
+        </p:nvSpPr>
+        <p:spPr>
+          <a:xfrm>
+            <a:off x="5278458" y="1515539"/>
+            <a:ext cx="2117375" cy="369332"/>
+          </a:xfrm>
+          <a:prstGeom prst="rect">
+            <a:avLst/>
+          </a:prstGeom>
+          <a:noFill/>
+        </p:spPr>
+        <p:txBody>
+          <a:bodyPr wrap="none" rtlCol="0">
+            <a:spAutoFit/>
+          </a:bodyPr>
+          <a:lstStyle/>
+          <a:p>
+            <a:r>
+              <a:rPr lang="en-GB" dirty="0" smtClean="0">
+                <a:solidFill>
+                  <a:srgbClr val="FF0000"/>
+                </a:solidFill>
+              </a:rPr>
+              <a:t>&lt;</a:t>
+            </a:r>
+            <a:r>
+              <a:rPr lang="en-GB" smtClean="0">
+                <a:solidFill>
+                  <a:srgbClr val="FF0000"/>
+                </a:solidFill>
+              </a:rPr>
+              <a:t>property holds???&gt;</a:t>
+            </a:r>
+            <a:endParaRPr lang="en-GB" dirty="0">
+              <a:solidFill>
+                <a:srgbClr val="FF0000"/>
+              </a:solidFill>
+            </a:endParaRPr>
+          </a:p>
+        </p:txBody>
+      </p:sp>
+    </p:spTree>
+    <p:extLst>
+      <p:ext uri="{BB962C8B-B14F-4D97-AF65-F5344CB8AC3E}">
+        <p14:creationId xmlns:p14="http://schemas.microsoft.com/office/powerpoint/2010/main" val="974398342"/>
+      </p:ext>
+    </p:extLst>
+  </p:cSld>
+  <p:clrMapOvr>
+    <a:masterClrMapping/>
+  </p:clrMapOvr>
+</p:sld>
+</file>
+
+<file path=ppt/slides/slide4.xml><?xml version="1.0" encoding="utf-8"?>
+<p:sld xmlns:a="http://schemas.openxmlformats.org/drawingml/2006/main" xmlns:r="http://schemas.openxmlformats.org/officeDocument/2006/relationships" xmlns:p="http://schemas.openxmlformats.org/presentationml/2006/main">
+  <p:cSld>
+    <p:spTree>
+      <p:nvGrpSpPr>
+        <p:cNvPr id="1" name=""/>
+        <p:cNvGrpSpPr/>
+        <p:nvPr/>
+      </p:nvGrpSpPr>
+      <p:grpSpPr>
+        <a:xfrm>
+          <a:off x="0" y="0"/>
+          <a:ext cx="0" cy="0"/>
+          <a:chOff x="0" y="0"/>
+          <a:chExt cx="0" cy="0"/>
+        </a:xfrm>
+      </p:grpSpPr>
+      <p:sp>
+        <p:nvSpPr>
+          <p:cNvPr id="2" name="Title 1"/>
+          <p:cNvSpPr>
+            <a:spLocks noGrp="1"/>
+          </p:cNvSpPr>
+          <p:nvPr>
+            <p:ph type="title"/>
+          </p:nvPr>
+        </p:nvSpPr>
+        <p:spPr/>
+        <p:txBody>
+          <a:bodyPr/>
+          <a:lstStyle/>
+          <a:p>
+            <a:r>
+              <a:rPr lang="en-GB" dirty="0" smtClean="0"/>
+              <a:t>Proof</a:t>
+            </a:r>
+            <a:endParaRPr lang="en-GB" dirty="0"/>
+          </a:p>
+        </p:txBody>
+      </p:sp>
+      <p:sp>
+        <p:nvSpPr>
+          <p:cNvPr id="3" name="Content Placeholder 2"/>
+          <p:cNvSpPr>
+            <a:spLocks noGrp="1"/>
+          </p:cNvSpPr>
+          <p:nvPr>
+            <p:ph idx="1"/>
+          </p:nvPr>
+        </p:nvSpPr>
+        <p:spPr/>
+        <p:txBody>
+          <a:bodyPr>
+            <a:normAutofit/>
+          </a:bodyPr>
+          <a:lstStyle/>
+          <a:p>
+            <a:r>
+              <a:rPr lang="en-GB" dirty="0" smtClean="0"/>
+              <a:t>Invariants are only checked on completion of the run (</a:t>
+            </a:r>
+            <a:r>
+              <a:rPr lang="en-GB" dirty="0" err="1" smtClean="0"/>
+              <a:t>iq</a:t>
+            </a:r>
+            <a:r>
+              <a:rPr lang="en-GB" dirty="0" smtClean="0"/>
+              <a:t>={} and </a:t>
+            </a:r>
+            <a:r>
+              <a:rPr lang="en-GB" dirty="0" err="1" smtClean="0"/>
+              <a:t>uc</a:t>
+            </a:r>
+            <a:r>
+              <a:rPr lang="en-GB" dirty="0" smtClean="0"/>
+              <a:t>=FALSE) </a:t>
+            </a:r>
+            <a:endParaRPr lang="en-GB" dirty="0"/>
+          </a:p>
+          <a:p>
+            <a:pPr lvl="1"/>
+            <a:r>
+              <a:rPr lang="en-GB" dirty="0" smtClean="0"/>
+              <a:t>an </a:t>
+            </a:r>
+            <a:r>
+              <a:rPr lang="en-GB" dirty="0" err="1" smtClean="0"/>
+              <a:t>anticedent</a:t>
+            </a:r>
+            <a:r>
+              <a:rPr lang="en-GB" dirty="0" smtClean="0"/>
+              <a:t> is automatically added to the &lt;property&gt; for this.</a:t>
+            </a:r>
+          </a:p>
+          <a:p>
+            <a:r>
+              <a:rPr lang="en-GB" dirty="0" smtClean="0"/>
+              <a:t>Transitions that react to preserve the invariant must be finalised to ensure they run</a:t>
+            </a:r>
+          </a:p>
+          <a:p>
+            <a:r>
+              <a:rPr lang="en-GB" dirty="0" smtClean="0"/>
+              <a:t>For </a:t>
+            </a:r>
+            <a:r>
+              <a:rPr lang="en-GB" dirty="0" err="1" smtClean="0"/>
+              <a:t>untriggered</a:t>
+            </a:r>
+            <a:r>
+              <a:rPr lang="en-GB" dirty="0" smtClean="0"/>
+              <a:t> transitions their negated guards are added to the </a:t>
+            </a:r>
+            <a:r>
+              <a:rPr lang="en-GB" dirty="0" err="1" smtClean="0"/>
+              <a:t>untriggered</a:t>
+            </a:r>
+            <a:r>
+              <a:rPr lang="en-GB" dirty="0" smtClean="0"/>
+              <a:t> completion event, hence the PO proves easily.</a:t>
+            </a:r>
+          </a:p>
+          <a:p>
+            <a:r>
+              <a:rPr lang="en-GB" dirty="0" smtClean="0"/>
+              <a:t>For triggered transitions, more is needed to show that the reaction gives invariant preservation at the ‘Firing </a:t>
+            </a:r>
+            <a:r>
+              <a:rPr lang="en-GB" dirty="0" err="1" smtClean="0"/>
+              <a:t>untriggered</a:t>
+            </a:r>
+            <a:r>
+              <a:rPr lang="en-GB" dirty="0" smtClean="0"/>
+              <a:t>’ state.</a:t>
+            </a:r>
+          </a:p>
+          <a:p>
+            <a:pPr lvl="1"/>
+            <a:r>
+              <a:rPr lang="en-GB" dirty="0" smtClean="0"/>
+              <a:t>Invariants are added </a:t>
+            </a:r>
+            <a:r>
+              <a:rPr lang="en-GB" dirty="0" err="1" smtClean="0"/>
+              <a:t>uc</a:t>
+            </a:r>
+            <a:r>
+              <a:rPr lang="en-GB" dirty="0" smtClean="0"/>
+              <a:t>=False &amp;</a:t>
+            </a:r>
+            <a:r>
+              <a:rPr lang="en-GB" dirty="0" err="1" smtClean="0"/>
+              <a:t>dt</a:t>
+            </a:r>
+            <a:r>
+              <a:rPr lang="en-GB" dirty="0" smtClean="0"/>
+              <a:t>={} =&gt; &lt;property&gt;</a:t>
+            </a:r>
+          </a:p>
+        </p:txBody>
+      </p:sp>
+    </p:spTree>
+    <p:extLst>
+      <p:ext uri="{BB962C8B-B14F-4D97-AF65-F5344CB8AC3E}">
+        <p14:creationId xmlns:p14="http://schemas.microsoft.com/office/powerpoint/2010/main" val="427688632"/>
+      </p:ext>
+    </p:extLst>
+  </p:cSld>
+  <p:clrMapOvr>
+    <a:masterClrMapping/>
+  </p:clrMapOvr>
+</p:sld>
+</file>
+
+<file path=ppt/slides/slide5.xml><?xml version="1.0" encoding="utf-8"?>
+<p:sld xmlns:a="http://schemas.openxmlformats.org/drawingml/2006/main" xmlns:r="http://schemas.openxmlformats.org/officeDocument/2006/relationships" xmlns:p="http://schemas.openxmlformats.org/presentationml/2006/main">
+  <p:cSld>
+    <p:spTree>
+      <p:nvGrpSpPr>
+        <p:cNvPr id="1" name=""/>
+        <p:cNvGrpSpPr/>
+        <p:nvPr/>
+      </p:nvGrpSpPr>
+      <p:grpSpPr>
+        <a:xfrm>
+          <a:off x="0" y="0"/>
+          <a:ext cx="0" cy="0"/>
+          <a:chOff x="0" y="0"/>
+          <a:chExt cx="0" cy="0"/>
+        </a:xfrm>
+      </p:grpSpPr>
+      <p:sp>
+        <p:nvSpPr>
+          <p:cNvPr id="2" name="Title 1"/>
+          <p:cNvSpPr>
+            <a:spLocks noGrp="1"/>
+          </p:cNvSpPr>
+          <p:nvPr>
+            <p:ph type="title"/>
+          </p:nvPr>
+        </p:nvSpPr>
+        <p:spPr/>
+        <p:txBody>
+          <a:bodyPr/>
+          <a:lstStyle/>
+          <a:p>
+            <a:r>
+              <a:rPr lang="en-GB" dirty="0" smtClean="0"/>
+              <a:t>Proof continued</a:t>
+            </a:r>
+            <a:endParaRPr lang="en-GB" dirty="0"/>
+          </a:p>
+        </p:txBody>
+      </p:sp>
+      <p:sp>
+        <p:nvSpPr>
+          <p:cNvPr id="3" name="Content Placeholder 2"/>
+          <p:cNvSpPr>
+            <a:spLocks noGrp="1"/>
+          </p:cNvSpPr>
+          <p:nvPr>
+            <p:ph idx="1"/>
+          </p:nvPr>
+        </p:nvSpPr>
+        <p:spPr/>
+        <p:txBody>
+          <a:bodyPr>
+            <a:normAutofit fontScale="77500" lnSpcReduction="20000"/>
+          </a:bodyPr>
+          <a:lstStyle/>
+          <a:p>
+            <a:r>
+              <a:rPr lang="en-GB" dirty="0" smtClean="0"/>
+              <a:t>Then the completion event PO proves automatically, but some new POs are generated for the added invariants</a:t>
+            </a:r>
+          </a:p>
+          <a:p>
+            <a:r>
+              <a:rPr lang="en-GB" dirty="0" err="1" smtClean="0"/>
+              <a:t>FutureTriggeredTransition</a:t>
+            </a:r>
+            <a:r>
+              <a:rPr lang="en-GB" dirty="0" smtClean="0"/>
+              <a:t> (abstract event for future triggered transitions) must preserve the invariant, so we add a guard for the &lt;property&gt;.</a:t>
+            </a:r>
+          </a:p>
+          <a:p>
+            <a:pPr lvl="1"/>
+            <a:r>
+              <a:rPr lang="en-GB" dirty="0" smtClean="0"/>
+              <a:t>This restricts future refinement </a:t>
+            </a:r>
+            <a:r>
+              <a:rPr lang="mr-IN" dirty="0" smtClean="0"/>
+              <a:t>–</a:t>
+            </a:r>
+            <a:r>
+              <a:rPr lang="en-GB" dirty="0" smtClean="0"/>
+              <a:t> since the new transition cannot modify old </a:t>
+            </a:r>
+            <a:r>
+              <a:rPr lang="en-GB" dirty="0" err="1" smtClean="0"/>
+              <a:t>vars</a:t>
+            </a:r>
+            <a:r>
+              <a:rPr lang="en-GB" dirty="0" smtClean="0"/>
+              <a:t> of the property, this guard is the only way that future transitions will satisfy the &lt;property&gt;</a:t>
+            </a:r>
+          </a:p>
+          <a:p>
+            <a:r>
+              <a:rPr lang="en-GB" dirty="0" err="1" smtClean="0"/>
+              <a:t>toFly</a:t>
+            </a:r>
+            <a:r>
+              <a:rPr lang="en-GB" dirty="0" smtClean="0"/>
+              <a:t>.. This </a:t>
+            </a:r>
+            <a:r>
+              <a:rPr lang="en-GB" dirty="0"/>
+              <a:t>could break the </a:t>
+            </a:r>
+            <a:r>
+              <a:rPr lang="en-GB" dirty="0" smtClean="0"/>
+              <a:t>added invariants if it is taken instead of </a:t>
+            </a:r>
+            <a:r>
+              <a:rPr lang="en-GB" dirty="0" err="1" smtClean="0"/>
+              <a:t>toLand</a:t>
+            </a:r>
+            <a:r>
+              <a:rPr lang="en-GB" dirty="0" smtClean="0"/>
+              <a:t>. It seems reasonable to exclude this by adding a guard that charge &gt;20 (i.e. enhancing the model rather than just getting a proof)</a:t>
+            </a:r>
+          </a:p>
+          <a:p>
+            <a:r>
+              <a:rPr lang="en-GB" dirty="0" smtClean="0"/>
+              <a:t>Not sure it will work.. </a:t>
+            </a:r>
+          </a:p>
+          <a:p>
+            <a:pPr lvl="1"/>
+            <a:r>
+              <a:rPr lang="en-GB" dirty="0" smtClean="0"/>
+              <a:t>decrease charge can break these new invariants.</a:t>
+            </a:r>
+          </a:p>
+          <a:p>
+            <a:pPr lvl="1"/>
+            <a:r>
+              <a:rPr lang="en-GB" dirty="0" err="1" smtClean="0"/>
+              <a:t>noTriggeredTransitionsEnabled</a:t>
+            </a:r>
+            <a:r>
+              <a:rPr lang="en-GB" dirty="0" smtClean="0"/>
+              <a:t> has the negated guard but it doesn’t easily establish the added invariant (internal Q)</a:t>
+            </a:r>
+          </a:p>
+          <a:p>
+            <a:r>
+              <a:rPr lang="en-GB" dirty="0" smtClean="0"/>
+              <a:t>Another thing, combinations could raise several internal triggers </a:t>
+            </a:r>
+            <a:r>
+              <a:rPr lang="mr-IN" dirty="0" smtClean="0"/>
+              <a:t>–</a:t>
+            </a:r>
+            <a:r>
+              <a:rPr lang="en-GB" dirty="0" smtClean="0"/>
+              <a:t> how do we ensure </a:t>
+            </a:r>
+            <a:r>
+              <a:rPr lang="en-GB" dirty="0" err="1" smtClean="0"/>
+              <a:t>toLand</a:t>
+            </a:r>
+            <a:r>
+              <a:rPr lang="en-GB" dirty="0" smtClean="0"/>
+              <a:t> gets priority? I went back to adding </a:t>
+            </a:r>
+            <a:r>
+              <a:rPr lang="en-GB" dirty="0" err="1" smtClean="0"/>
+              <a:t>toLand</a:t>
+            </a:r>
+            <a:r>
+              <a:rPr lang="en-GB" dirty="0" smtClean="0"/>
+              <a:t> : </a:t>
+            </a:r>
+            <a:r>
+              <a:rPr lang="en-GB" dirty="0" err="1" smtClean="0"/>
+              <a:t>SCXML_iq</a:t>
+            </a:r>
+            <a:r>
+              <a:rPr lang="en-GB" dirty="0" smtClean="0"/>
+              <a:t> to solve this.</a:t>
+            </a:r>
+            <a:endParaRPr lang="en-GB" dirty="0"/>
+          </a:p>
+        </p:txBody>
+      </p:sp>
+    </p:spTree>
+    <p:extLst>
+      <p:ext uri="{BB962C8B-B14F-4D97-AF65-F5344CB8AC3E}">
+        <p14:creationId xmlns:p14="http://schemas.microsoft.com/office/powerpoint/2010/main" val="1715160112"/>
       </p:ext>
     </p:extLst>
   </p:cSld>
@@ -4101,4 +5795,265 @@
     </a:ext>
   </a:extLst>
 </a:theme>
+</file>
+
+<file path=ppt/theme/theme2.xml><?xml version="1.0" encoding="utf-8"?>
+<a:theme xmlns:a="http://schemas.openxmlformats.org/drawingml/2006/main" name="Office Theme">
+  <a:themeElements>
+    <a:clrScheme name="Office">
+      <a:dk1>
+        <a:sysClr val="windowText" lastClr="000000"/>
+      </a:dk1>
+      <a:lt1>
+        <a:sysClr val="window" lastClr="FFFFFF"/>
+      </a:lt1>
+      <a:dk2>
+        <a:srgbClr val="44546A"/>
+      </a:dk2>
+      <a:lt2>
+        <a:srgbClr val="E7E6E6"/>
+      </a:lt2>
+      <a:accent1>
+        <a:srgbClr val="4472C4"/>
+      </a:accent1>
+      <a:accent2>
+        <a:srgbClr val="ED7D31"/>
+      </a:accent2>
+      <a:accent3>
+        <a:srgbClr val="A5A5A5"/>
+      </a:accent3>
+      <a:accent4>
+        <a:srgbClr val="FFC000"/>
+      </a:accent4>
+      <a:accent5>
+        <a:srgbClr val="5B9BD5"/>
+      </a:accent5>
+      <a:accent6>
+        <a:srgbClr val="70AD47"/>
+      </a:accent6>
+      <a:hlink>
+        <a:srgbClr val="0563C1"/>
+      </a:hlink>
+      <a:folHlink>
+        <a:srgbClr val="954F72"/>
+      </a:folHlink>
+    </a:clrScheme>
+    <a:fontScheme name="Office">
+      <a:majorFont>
+        <a:latin typeface="Calibri Light" panose="020F0302020204030204"/>
+        <a:ea typeface=""/>
+        <a:cs typeface=""/>
+        <a:font script="Jpan" typeface="Yu Gothic Light"/>
+        <a:font script="Hang" typeface="맑은 고딕"/>
+        <a:font script="Hans" typeface="DengXian Light"/>
+        <a:font script="Hant" typeface="新細明體"/>
+        <a:font script="Arab" typeface="Times New Roman"/>
+        <a:font script="Hebr" typeface="Times New Roman"/>
+        <a:font script="Thai" typeface="Angsana New"/>
+        <a:font script="Ethi" typeface="Nyala"/>
+        <a:font script="Beng" typeface="Vrinda"/>
+        <a:font script="Gujr" typeface="Shruti"/>
+        <a:font script="Khmr" typeface="MoolBoran"/>
+        <a:font script="Knda" typeface="Tunga"/>
+        <a:font script="Guru" typeface="Raavi"/>
+        <a:font script="Cans" typeface="Euphemia"/>
+        <a:font script="Cher" typeface="Plantagenet Cherokee"/>
+        <a:font script="Yiii" typeface="Microsoft Yi Baiti"/>
+        <a:font script="Tibt" typeface="Microsoft Himalaya"/>
+        <a:font script="Thaa" typeface="MV Boli"/>
+        <a:font script="Deva" typeface="Mangal"/>
+        <a:font script="Telu" typeface="Gautami"/>
+        <a:font script="Taml" typeface="Latha"/>
+        <a:font script="Syrc" typeface="Estrangelo Edessa"/>
+        <a:font script="Orya" typeface="Kalinga"/>
+        <a:font script="Mlym" typeface="Kartika"/>
+        <a:font script="Laoo" typeface="DokChampa"/>
+        <a:font script="Sinh" typeface="Iskoola Pota"/>
+        <a:font script="Mong" typeface="Mongolian Baiti"/>
+        <a:font script="Viet" typeface="Times New Roman"/>
+        <a:font script="Uigh" typeface="Microsoft Uighur"/>
+        <a:font script="Geor" typeface="Sylfaen"/>
+      </a:majorFont>
+      <a:minorFont>
+        <a:latin typeface="Calibri" panose="020F0502020204030204"/>
+        <a:ea typeface=""/>
+        <a:cs typeface=""/>
+        <a:font script="Jpan" typeface="Yu Gothic"/>
+        <a:font script="Hang" typeface="맑은 고딕"/>
+        <a:font script="Hans" typeface="DengXian"/>
+        <a:font script="Hant" typeface="新細明體"/>
+        <a:font script="Arab" typeface="Arial"/>
+        <a:font script="Hebr" typeface="Arial"/>
+        <a:font script="Thai" typeface="Cordia New"/>
+        <a:font script="Ethi" typeface="Nyala"/>
+        <a:font script="Beng" typeface="Vrinda"/>
+        <a:font script="Gujr" typeface="Shruti"/>
+        <a:font script="Khmr" typeface="DaunPenh"/>
+        <a:font script="Knda" typeface="Tunga"/>
+        <a:font script="Guru" typeface="Raavi"/>
+        <a:font script="Cans" typeface="Euphemia"/>
+        <a:font script="Cher" typeface="Plantagenet Cherokee"/>
+        <a:font script="Yiii" typeface="Microsoft Yi Baiti"/>
+        <a:font script="Tibt" typeface="Microsoft Himalaya"/>
+        <a:font script="Thaa" typeface="MV Boli"/>
+        <a:font script="Deva" typeface="Mangal"/>
+        <a:font script="Telu" typeface="Gautami"/>
+        <a:font script="Taml" typeface="Latha"/>
+        <a:font script="Syrc" typeface="Estrangelo Edessa"/>
+        <a:font script="Orya" typeface="Kalinga"/>
+        <a:font script="Mlym" typeface="Kartika"/>
+        <a:font script="Laoo" typeface="DokChampa"/>
+        <a:font script="Sinh" typeface="Iskoola Pota"/>
+        <a:font script="Mong" typeface="Mongolian Baiti"/>
+        <a:font script="Viet" typeface="Arial"/>
+        <a:font script="Uigh" typeface="Microsoft Uighur"/>
+        <a:font script="Geor" typeface="Sylfaen"/>
+      </a:minorFont>
+    </a:fontScheme>
+    <a:fmtScheme name="Office">
+      <a:fillStyleLst>
+        <a:solidFill>
+          <a:schemeClr val="phClr"/>
+        </a:solidFill>
+        <a:gradFill rotWithShape="1">
+          <a:gsLst>
+            <a:gs pos="0">
+              <a:schemeClr val="phClr">
+                <a:lumMod val="110000"/>
+                <a:satMod val="105000"/>
+                <a:tint val="67000"/>
+              </a:schemeClr>
+            </a:gs>
+            <a:gs pos="50000">
+              <a:schemeClr val="phClr">
+                <a:lumMod val="105000"/>
+                <a:satMod val="103000"/>
+                <a:tint val="73000"/>
+              </a:schemeClr>
+            </a:gs>
+            <a:gs pos="100000">
+              <a:schemeClr val="phClr">
+                <a:lumMod val="105000"/>
+                <a:satMod val="109000"/>
+                <a:tint val="81000"/>
+              </a:schemeClr>
+            </a:gs>
+          </a:gsLst>
+          <a:lin ang="5400000" scaled="0"/>
+        </a:gradFill>
+        <a:gradFill rotWithShape="1">
+          <a:gsLst>
+            <a:gs pos="0">
+              <a:schemeClr val="phClr">
+                <a:satMod val="103000"/>
+                <a:lumMod val="102000"/>
+                <a:tint val="94000"/>
+              </a:schemeClr>
+            </a:gs>
+            <a:gs pos="50000">
+              <a:schemeClr val="phClr">
+                <a:satMod val="110000"/>
+                <a:lumMod val="100000"/>
+                <a:shade val="100000"/>
+              </a:schemeClr>
+            </a:gs>
+            <a:gs pos="100000">
+              <a:schemeClr val="phClr">
+                <a:lumMod val="99000"/>
+                <a:satMod val="120000"/>
+                <a:shade val="78000"/>
+              </a:schemeClr>
+            </a:gs>
+          </a:gsLst>
+          <a:lin ang="5400000" scaled="0"/>
+        </a:gradFill>
+      </a:fillStyleLst>
+      <a:lnStyleLst>
+        <a:ln w="6350" cap="flat" cmpd="sng" algn="ctr">
+          <a:solidFill>
+            <a:schemeClr val="phClr"/>
+          </a:solidFill>
+          <a:prstDash val="solid"/>
+          <a:miter lim="800000"/>
+        </a:ln>
+        <a:ln w="12700" cap="flat" cmpd="sng" algn="ctr">
+          <a:solidFill>
+            <a:schemeClr val="phClr"/>
+          </a:solidFill>
+          <a:prstDash val="solid"/>
+          <a:miter lim="800000"/>
+        </a:ln>
+        <a:ln w="19050" cap="flat" cmpd="sng" algn="ctr">
+          <a:solidFill>
+            <a:schemeClr val="phClr"/>
+          </a:solidFill>
+          <a:prstDash val="solid"/>
+          <a:miter lim="800000"/>
+        </a:ln>
+      </a:lnStyleLst>
+      <a:effectStyleLst>
+        <a:effectStyle>
+          <a:effectLst/>
+        </a:effectStyle>
+        <a:effectStyle>
+          <a:effectLst/>
+        </a:effectStyle>
+        <a:effectStyle>
+          <a:effectLst>
+            <a:outerShdw blurRad="57150" dist="19050" dir="5400000" algn="ctr" rotWithShape="0">
+              <a:srgbClr val="000000">
+                <a:alpha val="63000"/>
+              </a:srgbClr>
+            </a:outerShdw>
+          </a:effectLst>
+        </a:effectStyle>
+      </a:effectStyleLst>
+      <a:bgFillStyleLst>
+        <a:solidFill>
+          <a:schemeClr val="phClr"/>
+        </a:solidFill>
+        <a:solidFill>
+          <a:schemeClr val="phClr">
+            <a:tint val="95000"/>
+            <a:satMod val="170000"/>
+          </a:schemeClr>
+        </a:solidFill>
+        <a:gradFill rotWithShape="1">
+          <a:gsLst>
+            <a:gs pos="0">
+              <a:schemeClr val="phClr">
+                <a:tint val="93000"/>
+                <a:satMod val="150000"/>
+                <a:shade val="98000"/>
+                <a:lumMod val="102000"/>
+              </a:schemeClr>
+            </a:gs>
+            <a:gs pos="50000">
+              <a:schemeClr val="phClr">
+                <a:tint val="98000"/>
+                <a:satMod val="130000"/>
+                <a:shade val="90000"/>
+                <a:lumMod val="103000"/>
+              </a:schemeClr>
+            </a:gs>
+            <a:gs pos="100000">
+              <a:schemeClr val="phClr">
+                <a:shade val="63000"/>
+                <a:satMod val="120000"/>
+              </a:schemeClr>
+            </a:gs>
+          </a:gsLst>
+          <a:lin ang="5400000" scaled="0"/>
+        </a:gradFill>
+      </a:bgFillStyleLst>
+    </a:fmtScheme>
+  </a:themeElements>
+  <a:objectDefaults/>
+  <a:extraClrSchemeLst/>
+  <a:extLst>
+    <a:ext uri="{05A4C25C-085E-4340-85A3-A5531E510DB2}">
+      <thm15:themeFamily xmlns:thm15="http://schemas.microsoft.com/office/thememl/2012/main" name="Office Theme" id="{62F939B6-93AF-4DB8-9C6B-D6C7DFDC589F}" vid="{4A3C46E8-61CC-4603-A589-7422A47A8E4A}"/>
+    </a:ext>
+  </a:extLst>
+</a:theme>
 </file>
</xml_diff>